<commit_message>
minor edits to section 3 materials
</commit_message>
<xml_diff>
--- a/presentations/3 - Programming Basics 1 - Poke the Box.pptx
+++ b/presentations/3 - Programming Basics 1 - Poke the Box.pptx
@@ -240,7 +240,7 @@
           <a:p>
             <a:fld id="{0C3747FC-B9FC-4317-A7AC-005EC1BA3397}" type="datetimeFigureOut">
               <a:rPr lang="en-US" smtClean="0"/>
-              <a:t>12/11/2023</a:t>
+              <a:t>4/2/2025</a:t>
             </a:fld>
             <a:endParaRPr lang="en-US"/>
           </a:p>
@@ -553,7 +553,7 @@
           <a:p>
             <a:r>
               <a:rPr lang="en-US" dirty="0"/>
-              <a:t>You’ll notice I named this session “Poke the Box”, which I think is a productive mentality when approaching a new language.</a:t>
+              <a:t>You’ll notice I named this session “Poke the Box”, which I think is a productive mentality when approaching a new programming language.</a:t>
             </a:r>
           </a:p>
           <a:p>
@@ -562,7 +562,7 @@
           <a:p>
             <a:r>
               <a:rPr lang="en-US" dirty="0"/>
-              <a:t>Try stuff – see what happens.  What can we learn?</a:t>
+              <a:t>The basic mentality: TRY STUFF – see what happens.  What can we learn?</a:t>
             </a:r>
           </a:p>
           <a:p>
@@ -571,7 +571,7 @@
           <a:p>
             <a:r>
               <a:rPr lang="en-US" dirty="0"/>
-              <a:t>We’ll start by looking at some very basic input &amp; output, and talk about what insights we can gain.</a:t>
+              <a:t>We’ll start by looking at some (maybe painfully) basic input &amp; output, and talk about what insights we can gain.</a:t>
             </a:r>
           </a:p>
         </p:txBody>
@@ -763,7 +763,7 @@
           <a:p>
             <a:r>
               <a:rPr lang="en-US" dirty="0"/>
-              <a:t>So what happens when you mix vectors and single numbers</a:t>
+              <a:t>I can hear you thinking, what happens when you mix vectors and single numbers?</a:t>
             </a:r>
           </a:p>
           <a:p>
@@ -1328,6 +1328,12 @@
             </a:r>
           </a:p>
           <a:p>
+            <a:r>
+              <a:rPr lang="en-US" dirty="0"/>
+              <a:t>also sounds like a laxative XD</a:t>
+            </a:r>
+          </a:p>
+          <a:p>
             <a:endParaRPr lang="en-US" dirty="0"/>
           </a:p>
           <a:p>
@@ -1621,7 +1627,16 @@
           <a:p>
             <a:r>
               <a:rPr lang="en-US" dirty="0"/>
-              <a:t>Can’t get more basic than this…</a:t>
+              <a:t>Can’t get more basic than this</a:t>
+            </a:r>
+          </a:p>
+          <a:p>
+            <a:endParaRPr lang="en-US" dirty="0"/>
+          </a:p>
+          <a:p>
+            <a:r>
+              <a:rPr lang="en-US" dirty="0"/>
+              <a:t>Here’s an RStudio window, and zooming in on the Console…</a:t>
             </a:r>
           </a:p>
         </p:txBody>
@@ -1921,6 +1936,15 @@
               <a:t>Sum, product, mean, median, quantile, standard deviation, and variance</a:t>
             </a:r>
           </a:p>
+          <a:p>
+            <a:endParaRPr lang="en-US" dirty="0"/>
+          </a:p>
+          <a:p>
+            <a:r>
+              <a:rPr lang="en-US" dirty="0"/>
+              <a:t>There’s more, this is just a few examples</a:t>
+            </a:r>
+          </a:p>
         </p:txBody>
       </p:sp>
       <p:sp>
@@ -2008,6 +2032,21 @@
               <a:t>An important R thing we need to talk about is NA, which is R’s way of handling blanks.</a:t>
             </a:r>
           </a:p>
+          <a:p>
+            <a:endParaRPr lang="en-US" dirty="0"/>
+          </a:p>
+          <a:p>
+            <a:r>
+              <a:rPr lang="en-US" dirty="0"/>
+              <a:t>--</a:t>
+            </a:r>
+          </a:p>
+          <a:p>
+            <a:r>
+              <a:rPr lang="en-US" dirty="0"/>
+              <a:t>What happens when we try to take a mean of a vector that contains a missing value?  Well, we don’t KNOW what the mean is!</a:t>
+            </a:r>
+          </a:p>
         </p:txBody>
       </p:sp>
       <p:sp>
@@ -2575,6 +2614,27 @@
               <a:t>So to bring it all home, just remember:</a:t>
             </a:r>
           </a:p>
+          <a:p>
+            <a:endParaRPr lang="en-US" dirty="0"/>
+          </a:p>
+          <a:p>
+            <a:r>
+              <a:rPr lang="en-US" dirty="0"/>
+              <a:t>--</a:t>
+            </a:r>
+          </a:p>
+          <a:p>
+            <a:r>
+              <a:rPr lang="en-US" dirty="0"/>
+              <a:t>Side note: this is one of THE most common data errors!</a:t>
+            </a:r>
+          </a:p>
+          <a:p>
+            <a:r>
+              <a:rPr lang="en-US" dirty="0"/>
+              <a:t>Personal favorite: number with a trailing space (someone pranking the biometrician??)</a:t>
+            </a:r>
+          </a:p>
         </p:txBody>
       </p:sp>
       <p:sp>
@@ -2659,11 +2719,26 @@
           <a:p>
             <a:r>
               <a:rPr lang="en-US" dirty="0"/>
-              <a:t>R does math … which is reassuring!</a:t>
-            </a:r>
-          </a:p>
-          <a:p>
-            <a:endParaRPr lang="en-US" dirty="0"/>
+              <a:t>Already, there are some insights!</a:t>
+            </a:r>
+          </a:p>
+          <a:p>
+            <a:r>
+              <a:rPr lang="en-US" dirty="0"/>
+              <a:t>--</a:t>
+            </a:r>
+          </a:p>
+          <a:p>
+            <a:r>
+              <a:rPr lang="en-US" dirty="0"/>
+              <a:t>R does math … which is reassuring</a:t>
+            </a:r>
+          </a:p>
+          <a:p>
+            <a:r>
+              <a:rPr lang="en-US" dirty="0"/>
+              <a:t>--</a:t>
+            </a:r>
           </a:p>
           <a:p>
             <a:r>
@@ -3608,7 +3683,10 @@
             </a:r>
           </a:p>
           <a:p>
-            <a:endParaRPr lang="en-US" dirty="0"/>
+            <a:r>
+              <a:rPr lang="en-US" dirty="0"/>
+              <a:t>--</a:t>
+            </a:r>
           </a:p>
           <a:p>
             <a:r>
@@ -3617,7 +3695,10 @@
             </a:r>
           </a:p>
           <a:p>
-            <a:endParaRPr lang="en-US" dirty="0"/>
+            <a:r>
+              <a:rPr lang="en-US" dirty="0"/>
+              <a:t>--</a:t>
+            </a:r>
           </a:p>
           <a:p>
             <a:r>
@@ -3713,21 +3794,24 @@
             </a:r>
           </a:p>
           <a:p>
+            <a:r>
+              <a:rPr lang="en-US" dirty="0"/>
+              <a:t>--</a:t>
+            </a:r>
+          </a:p>
+          <a:p>
+            <a:r>
+              <a:rPr lang="en-US" dirty="0"/>
+              <a:t>But, maybe a MORE important insight: ERRORS HAPPEN!  And with every error, we get a message that might give us some clues as to what went wrong</a:t>
+            </a:r>
+          </a:p>
+          <a:p>
             <a:endParaRPr lang="en-US" dirty="0"/>
           </a:p>
           <a:p>
             <a:r>
               <a:rPr lang="en-US" dirty="0"/>
-              <a:t>But, maybe a MORE important insight:: ERRORS HAPPEN!  And with every error, we get a message that might give us some clues as to what went wrong</a:t>
-            </a:r>
-          </a:p>
-          <a:p>
-            <a:endParaRPr lang="en-US" dirty="0"/>
-          </a:p>
-          <a:p>
-            <a:r>
-              <a:rPr lang="en-US" dirty="0"/>
-              <a:t>Note: the “could not find function” probably just means something is spelled wrong</a:t>
+              <a:t>Note: the “could not find function” probably just means something is spelled wrong (or in this case, capitalized wrong)</a:t>
             </a:r>
           </a:p>
         </p:txBody>
@@ -3814,7 +3898,22 @@
           <a:p>
             <a:r>
               <a:rPr lang="en-US" dirty="0"/>
-              <a:t>How about these two lines?  What happened?</a:t>
+              <a:t>How about these TWO lines?  What happened?</a:t>
+            </a:r>
+          </a:p>
+          <a:p>
+            <a:endParaRPr lang="en-US" dirty="0"/>
+          </a:p>
+          <a:p>
+            <a:r>
+              <a:rPr lang="en-US" dirty="0"/>
+              <a:t>--</a:t>
+            </a:r>
+          </a:p>
+          <a:p>
+            <a:r>
+              <a:rPr lang="en-US" dirty="0"/>
+              <a:t>Meaning of life, adjusted for inflation?</a:t>
             </a:r>
           </a:p>
         </p:txBody>
@@ -3899,7 +3998,16 @@
           <a:bodyPr/>
           <a:lstStyle/>
           <a:p>
-            <a:endParaRPr lang="en-US" dirty="0"/>
+            <a:r>
+              <a:rPr lang="en-US" dirty="0"/>
+              <a:t>--</a:t>
+            </a:r>
+          </a:p>
+          <a:p>
+            <a:r>
+              <a:rPr lang="en-US" dirty="0"/>
+              <a:t>… you can store variables using this angle bracket hyphen thingy that looks like a leftward arrow…</a:t>
+            </a:r>
           </a:p>
         </p:txBody>
       </p:sp>
@@ -3989,12 +4097,18 @@
             </a:r>
           </a:p>
           <a:p>
+            <a:r>
+              <a:rPr lang="en-US" dirty="0"/>
+              <a:t>Introducing the c() function (c for concatenate)</a:t>
+            </a:r>
+          </a:p>
+          <a:p>
             <a:endParaRPr lang="en-US" dirty="0"/>
           </a:p>
           <a:p>
             <a:r>
               <a:rPr lang="en-US" dirty="0"/>
-              <a:t>…and this is an important enough concept that it gets its own name.  If it’s helpful, you can think of a vector as being like a COLUMN of a spreadsheet.</a:t>
+              <a:t>…and this is an important enough concept that it gets its own name.  If it’s helpful, you can think of a vector as being like ONE COLUMN of a spreadsheet.</a:t>
             </a:r>
           </a:p>
           <a:p>
@@ -4200,7 +4314,7 @@
           <a:p>
             <a:fld id="{00F5AAE2-11C8-4D46-A716-B78E4D7C1BCB}" type="datetimeFigureOut">
               <a:rPr lang="en-US" smtClean="0"/>
-              <a:t>12/11/2023</a:t>
+              <a:t>4/2/2025</a:t>
             </a:fld>
             <a:endParaRPr lang="en-US"/>
           </a:p>
@@ -4398,7 +4512,7 @@
           <a:p>
             <a:fld id="{00F5AAE2-11C8-4D46-A716-B78E4D7C1BCB}" type="datetimeFigureOut">
               <a:rPr lang="en-US" smtClean="0"/>
-              <a:t>12/11/2023</a:t>
+              <a:t>4/2/2025</a:t>
             </a:fld>
             <a:endParaRPr lang="en-US"/>
           </a:p>
@@ -4606,7 +4720,7 @@
           <a:p>
             <a:fld id="{00F5AAE2-11C8-4D46-A716-B78E4D7C1BCB}" type="datetimeFigureOut">
               <a:rPr lang="en-US" smtClean="0"/>
-              <a:t>12/11/2023</a:t>
+              <a:t>4/2/2025</a:t>
             </a:fld>
             <a:endParaRPr lang="en-US"/>
           </a:p>
@@ -4804,7 +4918,7 @@
           <a:p>
             <a:fld id="{00F5AAE2-11C8-4D46-A716-B78E4D7C1BCB}" type="datetimeFigureOut">
               <a:rPr lang="en-US" smtClean="0"/>
-              <a:t>12/11/2023</a:t>
+              <a:t>4/2/2025</a:t>
             </a:fld>
             <a:endParaRPr lang="en-US"/>
           </a:p>
@@ -5079,7 +5193,7 @@
           <a:p>
             <a:fld id="{00F5AAE2-11C8-4D46-A716-B78E4D7C1BCB}" type="datetimeFigureOut">
               <a:rPr lang="en-US" smtClean="0"/>
-              <a:t>12/11/2023</a:t>
+              <a:t>4/2/2025</a:t>
             </a:fld>
             <a:endParaRPr lang="en-US"/>
           </a:p>
@@ -5344,7 +5458,7 @@
           <a:p>
             <a:fld id="{00F5AAE2-11C8-4D46-A716-B78E4D7C1BCB}" type="datetimeFigureOut">
               <a:rPr lang="en-US" smtClean="0"/>
-              <a:t>12/11/2023</a:t>
+              <a:t>4/2/2025</a:t>
             </a:fld>
             <a:endParaRPr lang="en-US"/>
           </a:p>
@@ -5756,7 +5870,7 @@
           <a:p>
             <a:fld id="{00F5AAE2-11C8-4D46-A716-B78E4D7C1BCB}" type="datetimeFigureOut">
               <a:rPr lang="en-US" smtClean="0"/>
-              <a:t>12/11/2023</a:t>
+              <a:t>4/2/2025</a:t>
             </a:fld>
             <a:endParaRPr lang="en-US"/>
           </a:p>
@@ -5897,7 +6011,7 @@
           <a:p>
             <a:fld id="{00F5AAE2-11C8-4D46-A716-B78E4D7C1BCB}" type="datetimeFigureOut">
               <a:rPr lang="en-US" smtClean="0"/>
-              <a:t>12/11/2023</a:t>
+              <a:t>4/2/2025</a:t>
             </a:fld>
             <a:endParaRPr lang="en-US"/>
           </a:p>
@@ -6010,7 +6124,7 @@
           <a:p>
             <a:fld id="{00F5AAE2-11C8-4D46-A716-B78E4D7C1BCB}" type="datetimeFigureOut">
               <a:rPr lang="en-US" smtClean="0"/>
-              <a:t>12/11/2023</a:t>
+              <a:t>4/2/2025</a:t>
             </a:fld>
             <a:endParaRPr lang="en-US"/>
           </a:p>
@@ -6321,7 +6435,7 @@
           <a:p>
             <a:fld id="{00F5AAE2-11C8-4D46-A716-B78E4D7C1BCB}" type="datetimeFigureOut">
               <a:rPr lang="en-US" smtClean="0"/>
-              <a:t>12/11/2023</a:t>
+              <a:t>4/2/2025</a:t>
             </a:fld>
             <a:endParaRPr lang="en-US"/>
           </a:p>
@@ -6609,7 +6723,7 @@
           <a:p>
             <a:fld id="{00F5AAE2-11C8-4D46-A716-B78E4D7C1BCB}" type="datetimeFigureOut">
               <a:rPr lang="en-US" smtClean="0"/>
-              <a:t>12/11/2023</a:t>
+              <a:t>4/2/2025</a:t>
             </a:fld>
             <a:endParaRPr lang="en-US"/>
           </a:p>
@@ -6850,7 +6964,7 @@
           <a:p>
             <a:fld id="{00F5AAE2-11C8-4D46-A716-B78E4D7C1BCB}" type="datetimeFigureOut">
               <a:rPr lang="en-US" smtClean="0"/>
-              <a:t>12/11/2023</a:t>
+              <a:t>4/2/2025</a:t>
             </a:fld>
             <a:endParaRPr lang="en-US"/>
           </a:p>
@@ -29027,8 +29141,8 @@
         </p:nvSpPr>
         <p:spPr>
           <a:xfrm>
-            <a:off x="8094796" y="3254635"/>
-            <a:ext cx="3851398" cy="3303639"/>
+            <a:off x="7905509" y="3254635"/>
+            <a:ext cx="4097437" cy="3303639"/>
           </a:xfrm>
           <a:prstGeom prst="rect">
             <a:avLst/>
@@ -29220,14 +29334,7 @@
           <a:p>
             <a:r>
               <a:rPr lang="en-US" dirty="0"/>
-              <a:t>R will probably try to alphabetize your factor levels (May will come after June)</a:t>
-            </a:r>
-          </a:p>
-          <a:p>
-            <a:pPr lvl="2"/>
-            <a:r>
-              <a:rPr lang="en-US" dirty="0"/>
-              <a:t>Come to think of it, I’m writing this in June 2023 and it feels like May hasn’t happened yet</a:t>
+              <a:t>R will probably try to alphabetize your factor levels (High will come before Low and Medium)</a:t>
             </a:r>
           </a:p>
         </p:txBody>
@@ -32496,7 +32603,7 @@
                             </p:stCondLst>
                             <p:childTnLst>
                               <p:par>
-                                <p:cTn id="5" presetID="1" presetClass="entr" presetSubtype="0" fill="hold" nodeType="clickEffect">
+                                <p:cTn id="5" presetID="1" presetClass="entr" presetSubtype="0" fill="hold" grpId="0" nodeType="clickEffect">
                                   <p:stCondLst>
                                     <p:cond delay="0"/>
                                   </p:stCondLst>
@@ -32504,6 +32611,55 @@
                                     <p:set>
                                       <p:cBhvr>
                                         <p:cTn id="6" dur="1" fill="hold">
+                                          <p:stCondLst>
+                                            <p:cond delay="0"/>
+                                          </p:stCondLst>
+                                        </p:cTn>
+                                        <p:tgtEl>
+                                          <p:spTgt spid="6">
+                                            <p:txEl>
+                                              <p:pRg st="0" end="0"/>
+                                            </p:txEl>
+                                          </p:spTgt>
+                                        </p:tgtEl>
+                                        <p:attrNameLst>
+                                          <p:attrName>style.visibility</p:attrName>
+                                        </p:attrNameLst>
+                                      </p:cBhvr>
+                                      <p:to>
+                                        <p:strVal val="visible"/>
+                                      </p:to>
+                                    </p:set>
+                                  </p:childTnLst>
+                                </p:cTn>
+                              </p:par>
+                            </p:childTnLst>
+                          </p:cTn>
+                        </p:par>
+                      </p:childTnLst>
+                    </p:cTn>
+                  </p:par>
+                  <p:par>
+                    <p:cTn id="7" fill="hold">
+                      <p:stCondLst>
+                        <p:cond delay="indefinite"/>
+                      </p:stCondLst>
+                      <p:childTnLst>
+                        <p:par>
+                          <p:cTn id="8" fill="hold">
+                            <p:stCondLst>
+                              <p:cond delay="0"/>
+                            </p:stCondLst>
+                            <p:childTnLst>
+                              <p:par>
+                                <p:cTn id="9" presetID="1" presetClass="entr" presetSubtype="0" fill="hold" nodeType="clickEffect">
+                                  <p:stCondLst>
+                                    <p:cond delay="0"/>
+                                  </p:stCondLst>
+                                  <p:childTnLst>
+                                    <p:set>
+                                      <p:cBhvr>
+                                        <p:cTn id="10" dur="1" fill="hold">
                                           <p:stCondLst>
                                             <p:cond delay="0"/>
                                           </p:stCondLst>
@@ -32527,14 +32683,14 @@
                                 </p:cTn>
                               </p:par>
                               <p:par>
-                                <p:cTn id="7" presetID="1" presetClass="entr" presetSubtype="0" fill="hold" nodeType="withEffect">
+                                <p:cTn id="11" presetID="1" presetClass="entr" presetSubtype="0" fill="hold" nodeType="withEffect">
                                   <p:stCondLst>
                                     <p:cond delay="0"/>
                                   </p:stCondLst>
                                   <p:childTnLst>
                                     <p:set>
                                       <p:cBhvr>
-                                        <p:cTn id="8" dur="1" fill="hold">
+                                        <p:cTn id="12" dur="1" fill="hold">
                                           <p:stCondLst>
                                             <p:cond delay="0"/>
                                           </p:stCondLst>
@@ -32564,26 +32720,26 @@
                     </p:cTn>
                   </p:par>
                   <p:par>
-                    <p:cTn id="9" fill="hold">
+                    <p:cTn id="13" fill="hold">
                       <p:stCondLst>
                         <p:cond delay="indefinite"/>
                       </p:stCondLst>
                       <p:childTnLst>
                         <p:par>
-                          <p:cTn id="10" fill="hold">
+                          <p:cTn id="14" fill="hold">
                             <p:stCondLst>
                               <p:cond delay="0"/>
                             </p:stCondLst>
                             <p:childTnLst>
                               <p:par>
-                                <p:cTn id="11" presetID="1" presetClass="entr" presetSubtype="0" fill="hold" nodeType="clickEffect">
+                                <p:cTn id="15" presetID="1" presetClass="entr" presetSubtype="0" fill="hold" nodeType="clickEffect">
                                   <p:stCondLst>
                                     <p:cond delay="0"/>
                                   </p:stCondLst>
                                   <p:childTnLst>
                                     <p:set>
                                       <p:cBhvr>
-                                        <p:cTn id="12" dur="1" fill="hold">
+                                        <p:cTn id="16" dur="1" fill="hold">
                                           <p:stCondLst>
                                             <p:cond delay="0"/>
                                           </p:stCondLst>
@@ -32607,14 +32763,14 @@
                                 </p:cTn>
                               </p:par>
                               <p:par>
-                                <p:cTn id="13" presetID="1" presetClass="entr" presetSubtype="0" fill="hold" nodeType="withEffect">
+                                <p:cTn id="17" presetID="1" presetClass="entr" presetSubtype="0" fill="hold" nodeType="withEffect">
                                   <p:stCondLst>
                                     <p:cond delay="0"/>
                                   </p:stCondLst>
                                   <p:childTnLst>
                                     <p:set>
                                       <p:cBhvr>
-                                        <p:cTn id="14" dur="1" fill="hold">
+                                        <p:cTn id="18" dur="1" fill="hold">
                                           <p:stCondLst>
                                             <p:cond delay="0"/>
                                           </p:stCondLst>
@@ -32644,26 +32800,26 @@
                     </p:cTn>
                   </p:par>
                   <p:par>
-                    <p:cTn id="15" fill="hold">
+                    <p:cTn id="19" fill="hold">
                       <p:stCondLst>
                         <p:cond delay="indefinite"/>
                       </p:stCondLst>
                       <p:childTnLst>
                         <p:par>
-                          <p:cTn id="16" fill="hold">
+                          <p:cTn id="20" fill="hold">
                             <p:stCondLst>
                               <p:cond delay="0"/>
                             </p:stCondLst>
                             <p:childTnLst>
                               <p:par>
-                                <p:cTn id="17" presetID="1" presetClass="entr" presetSubtype="0" fill="hold" nodeType="clickEffect">
+                                <p:cTn id="21" presetID="1" presetClass="entr" presetSubtype="0" fill="hold" nodeType="clickEffect">
                                   <p:stCondLst>
                                     <p:cond delay="0"/>
                                   </p:stCondLst>
                                   <p:childTnLst>
                                     <p:set>
                                       <p:cBhvr>
-                                        <p:cTn id="18" dur="1" fill="hold">
+                                        <p:cTn id="22" dur="1" fill="hold">
                                           <p:stCondLst>
                                             <p:cond delay="0"/>
                                           </p:stCondLst>
@@ -32709,6 +32865,9 @@
         </p:cTn>
       </p:par>
     </p:tnLst>
+    <p:bldLst>
+      <p:bldP spid="6" grpId="0" build="p"/>
+    </p:bldLst>
   </p:timing>
 </p:sld>
 </file>
@@ -36209,7 +36368,11 @@
           <a:p>
             <a:r>
               <a:rPr lang="en-US" dirty="0"/>
-              <a:t>R ignores whitespace between things</a:t>
+              <a:t>R ignores whitespace </a:t>
+            </a:r>
+            <a:r>
+              <a:rPr lang="en-US" u="sng" dirty="0"/>
+              <a:t>between things</a:t>
             </a:r>
           </a:p>
           <a:p>
@@ -42810,7 +42973,17 @@
                   </a:schemeClr>
                 </a:solidFill>
               </a:rPr>
-              <a:t>R ignores whitespace</a:t>
+              <a:t>R ignores whitespace </a:t>
+            </a:r>
+            <a:r>
+              <a:rPr lang="en-US" u="sng" dirty="0">
+                <a:solidFill>
+                  <a:schemeClr val="bg1">
+                    <a:lumMod val="65000"/>
+                  </a:schemeClr>
+                </a:solidFill>
+              </a:rPr>
+              <a:t>between things</a:t>
             </a:r>
           </a:p>
           <a:p>
@@ -43795,28 +43968,45 @@
                   </a:schemeClr>
                 </a:solidFill>
               </a:rPr>
-              <a:t>R ignores whitespace</a:t>
-            </a:r>
-          </a:p>
-          <a:p>
-            <a:r>
-              <a:rPr lang="en-US" dirty="0">
+              <a:t>R ignores whitespace </a:t>
+            </a:r>
+            <a:r>
+              <a:rPr lang="en-US" u="sng" dirty="0">
                 <a:solidFill>
                   <a:schemeClr val="bg1">
                     <a:lumMod val="65000"/>
                   </a:schemeClr>
                 </a:solidFill>
               </a:rPr>
-              <a:t>R uses </a:t>
-            </a:r>
-            <a:r>
-              <a:rPr lang="en-US" b="1" dirty="0">
+              <a:t>between things</a:t>
+            </a:r>
+            <a:endParaRPr lang="en-US" dirty="0">
+              <a:solidFill>
+                <a:schemeClr val="bg1">
+                  <a:lumMod val="65000"/>
+                </a:schemeClr>
+              </a:solidFill>
+            </a:endParaRPr>
+          </a:p>
+          <a:p>
+            <a:r>
+              <a:rPr lang="en-US" dirty="0">
                 <a:solidFill>
                   <a:schemeClr val="bg1">
                     <a:lumMod val="65000"/>
                   </a:schemeClr>
                 </a:solidFill>
               </a:rPr>
+              <a:t>R uses </a:t>
+            </a:r>
+            <a:r>
+              <a:rPr lang="en-US" b="1" dirty="0">
+                <a:solidFill>
+                  <a:schemeClr val="bg1">
+                    <a:lumMod val="65000"/>
+                  </a:schemeClr>
+                </a:solidFill>
+              </a:rPr>
               <a:t>functions</a:t>
             </a:r>
           </a:p>
@@ -43843,7 +44033,7 @@
             <a:pPr lvl="1"/>
             <a:r>
               <a:rPr lang="en-US" dirty="0"/>
-              <a:t>Errors are not problems, just puzzles (Error messages might be clues)</a:t>
+              <a:t>“Errors are not problems, just puzzles” (Error messages might be clues)</a:t>
             </a:r>
           </a:p>
         </p:txBody>
@@ -44784,7 +44974,7 @@
             <a:pPr lvl="1"/>
             <a:r>
               <a:rPr lang="en-US" dirty="0"/>
-              <a:t>Terminology: this is referred to as an </a:t>
+              <a:t>Terminology: this is sometimes referred to as an </a:t>
             </a:r>
             <a:r>
               <a:rPr lang="en-US" b="1" dirty="0"/>
@@ -44800,6 +44990,10 @@
               <a:rPr lang="en-US" b="1" dirty="0"/>
               <a:t>You can make names descriptive</a:t>
             </a:r>
+          </a:p>
+          <a:p>
+            <a:pPr lvl="1"/>
+            <a:endParaRPr lang="en-US" b="1" dirty="0"/>
           </a:p>
         </p:txBody>
       </p:sp>
@@ -45079,6 +45273,36 @@
           </a:p>
         </p:txBody>
       </p:sp>
+      <p:pic>
+        <p:nvPicPr>
+          <p:cNvPr id="3" name="Picture 2">
+            <a:extLst>
+              <a:ext uri="{FF2B5EF4-FFF2-40B4-BE49-F238E27FC236}">
+                <a16:creationId xmlns:a16="http://schemas.microsoft.com/office/drawing/2014/main" id="{6B5CFA07-9501-A5FD-1CBC-B23BEBCAAB06}"/>
+              </a:ext>
+            </a:extLst>
+          </p:cNvPr>
+          <p:cNvPicPr>
+            <a:picLocks noChangeAspect="1"/>
+          </p:cNvPicPr>
+          <p:nvPr/>
+        </p:nvPicPr>
+        <p:blipFill>
+          <a:blip r:embed="rId3"/>
+          <a:stretch>
+            <a:fillRect/>
+          </a:stretch>
+        </p:blipFill>
+        <p:spPr>
+          <a:xfrm>
+            <a:off x="8866208" y="4132160"/>
+            <a:ext cx="2625873" cy="2625873"/>
+          </a:xfrm>
+          <a:prstGeom prst="rect">
+            <a:avLst/>
+          </a:prstGeom>
+        </p:spPr>
+      </p:pic>
     </p:spTree>
     <p:extLst>
       <p:ext uri="{BB962C8B-B14F-4D97-AF65-F5344CB8AC3E}">
@@ -45275,6 +45499,51 @@
                                               <p:pRg st="4" end="4"/>
                                             </p:txEl>
                                           </p:spTgt>
+                                        </p:tgtEl>
+                                        <p:attrNameLst>
+                                          <p:attrName>style.visibility</p:attrName>
+                                        </p:attrNameLst>
+                                      </p:cBhvr>
+                                      <p:to>
+                                        <p:strVal val="visible"/>
+                                      </p:to>
+                                    </p:set>
+                                  </p:childTnLst>
+                                </p:cTn>
+                              </p:par>
+                            </p:childTnLst>
+                          </p:cTn>
+                        </p:par>
+                      </p:childTnLst>
+                    </p:cTn>
+                  </p:par>
+                  <p:par>
+                    <p:cTn id="19" fill="hold">
+                      <p:stCondLst>
+                        <p:cond delay="indefinite"/>
+                      </p:stCondLst>
+                      <p:childTnLst>
+                        <p:par>
+                          <p:cTn id="20" fill="hold">
+                            <p:stCondLst>
+                              <p:cond delay="0"/>
+                            </p:stCondLst>
+                            <p:childTnLst>
+                              <p:par>
+                                <p:cTn id="21" presetID="1" presetClass="entr" presetSubtype="0" fill="hold" nodeType="clickEffect">
+                                  <p:stCondLst>
+                                    <p:cond delay="0"/>
+                                  </p:stCondLst>
+                                  <p:childTnLst>
+                                    <p:set>
+                                      <p:cBhvr>
+                                        <p:cTn id="22" dur="1" fill="hold">
+                                          <p:stCondLst>
+                                            <p:cond delay="0"/>
+                                          </p:stCondLst>
+                                        </p:cTn>
+                                        <p:tgtEl>
+                                          <p:spTgt spid="3"/>
                                         </p:tgtEl>
                                         <p:attrNameLst>
                                           <p:attrName>style.visibility</p:attrName>

</xml_diff>